<commit_message>
Rename vtc-vta-service crate to vta-service
Simplify the crate name to match the project's common shorthand.
Updates directory, Cargo.toml, workspace config, all docs, and the
PowerPoint overview.

Co-Authored-By: Claude Opus 4.6 <noreply@anthropic.com>
</commit_message>
<xml_diff>
--- a/docs/VTA_Service_Overview.pptx
+++ b/docs/VTA_Service_Overview.pptx
@@ -14167,7 +14167,7 @@
               </a:defRPr>
             </a:pPr>
             <a:r>
-              <a:t>vtc-vta setup</a:t>
+              <a:t>vta-service setup</a:t>
             </a:r>
           </a:p>
           <a:p>
@@ -16209,7 +16209,7 @@
               </a:defRPr>
             </a:pPr>
             <a:r>
-              <a:t>vtc-vta-service</a:t>
+              <a:t>vta-service</a:t>
             </a:r>
           </a:p>
           <a:p>

</xml_diff>